<commit_message>
refine, add report, incorporate feedback
refine data cleaning, add top quilt makers report, incorporate feedback from data owner
</commit_message>
<xml_diff>
--- a/Quilt Makers Slides.pptx
+++ b/Quilt Makers Slides.pptx
@@ -1097,7 +1097,16 @@
               <a:buNone/>
             </a:pPr>
             <a:r>
-              <a:t/>
+              <a:rPr lang="en"/>
+              <a:t>A reminder here: the analysis includes the 3440 makers that had complete (as defined by this analysis) records and their 5602 quilts. This analysis does not cover the 93,229 quilts that are </a:t>
+            </a:r>
+            <a:r>
+              <a:rPr lang="en"/>
+              <a:t>available</a:t>
+            </a:r>
+            <a:r>
+              <a:rPr lang="en"/>
+              <a:t> in the QuiltIndex. We must remember that this analysis is done on a subset of records in QuiltIndex, which is itself a subset of quilt making itself. This analysis is giving us a peek into that world - not a comprehensive review.</a:t>
             </a:r>
             <a:endParaRPr/>
           </a:p>
@@ -3679,7 +3688,7 @@
             </a:pPr>
             <a:r>
               <a:rPr lang="en"/>
-              <a:t>So what about the quilts in 1700-1799 that have some extra data? The few quilts that have survived from this time period are either very sentimental or very beautiful or both - probably contributing to the care of both the quilt and the quilt data</a:t>
+              <a:t>So what about the quilts in 1700-1799 that have some extra data? The few quilts that have survived from this time period are either very sentimental or very beautiful or both - probably contributing to the care of both the quilt and the quilt data by the owners.</a:t>
             </a:r>
             <a:endParaRPr/>
           </a:p>
@@ -11398,7 +11407,7 @@
             </a:pPr>
             <a:r>
               <a:rPr lang="en"/>
-              <a:t>Collected by many different institutions </a:t>
+              <a:t>Collected by many different institutions and individuals</a:t>
             </a:r>
             <a:endParaRPr/>
           </a:p>
@@ -11436,7 +11445,7 @@
             </a:pPr>
             <a:r>
               <a:rPr lang="en"/>
-              <a:t>Began with paper and moved to digital</a:t>
+              <a:t>Data was collected by groups before the QuiltIndex started</a:t>
             </a:r>
             <a:endParaRPr/>
           </a:p>
@@ -11453,7 +11462,45 @@
             </a:pPr>
             <a:r>
               <a:rPr lang="en"/>
-              <a:t>Collected as free-form data - no </a:t>
+              <a:t>Each group had their own fields and formatting for collecting data</a:t>
+            </a:r>
+            <a:endParaRPr/>
+          </a:p>
+          <a:p>
+            <a:pPr indent="-342900" lvl="0" marL="457200" rtl="0" algn="l">
+              <a:spcBef>
+                <a:spcPts val="0"/>
+              </a:spcBef>
+              <a:spcAft>
+                <a:spcPts val="0"/>
+              </a:spcAft>
+              <a:buSzPts val="1800"/>
+              <a:buChar char="●"/>
+            </a:pPr>
+            <a:r>
+              <a:rPr lang="en"/>
+              <a:t>Quilt data collection b</a:t>
+            </a:r>
+            <a:r>
+              <a:rPr lang="en"/>
+              <a:t>egan with paper records and moved to digital</a:t>
+            </a:r>
+            <a:endParaRPr/>
+          </a:p>
+          <a:p>
+            <a:pPr indent="-342900" lvl="0" marL="457200" rtl="0" algn="l">
+              <a:spcBef>
+                <a:spcPts val="0"/>
+              </a:spcBef>
+              <a:spcAft>
+                <a:spcPts val="0"/>
+              </a:spcAft>
+              <a:buSzPts val="1800"/>
+              <a:buChar char="●"/>
+            </a:pPr>
+            <a:r>
+              <a:rPr lang="en"/>
+              <a:t>Data was collected as free-form data - no </a:t>
             </a:r>
             <a:r>
               <a:rPr lang="en"/>
@@ -11462,23 +11509,6 @@
             <a:r>
               <a:rPr lang="en"/>
               <a:t> formatting</a:t>
-            </a:r>
-            <a:endParaRPr/>
-          </a:p>
-          <a:p>
-            <a:pPr indent="-342900" lvl="0" marL="457200" rtl="0" algn="l">
-              <a:spcBef>
-                <a:spcPts val="0"/>
-              </a:spcBef>
-              <a:spcAft>
-                <a:spcPts val="0"/>
-              </a:spcAft>
-              <a:buSzPts val="1800"/>
-              <a:buChar char="●"/>
-            </a:pPr>
-            <a:r>
-              <a:rPr lang="en"/>
-              <a:t>Emphasized “more data” rather than “consistent data”</a:t>
             </a:r>
             <a:endParaRPr/>
           </a:p>
@@ -11568,18 +11598,37 @@
         </p:spPr>
         <p:txBody>
           <a:bodyPr anchorCtr="0" anchor="t" bIns="91425" lIns="91425" spcFirstLastPara="1" rIns="91425" wrap="square" tIns="91425">
-            <a:normAutofit lnSpcReduction="20000"/>
+            <a:normAutofit fontScale="77500" lnSpcReduction="20000"/>
           </a:bodyPr>
           <a:lstStyle/>
           <a:p>
-            <a:pPr indent="-342900" lvl="0" marL="457200" rtl="0" algn="l">
-              <a:spcBef>
-                <a:spcPts val="0"/>
-              </a:spcBef>
-              <a:spcAft>
-                <a:spcPts val="0"/>
-              </a:spcAft>
-              <a:buSzPts val="1800"/>
+            <a:pPr indent="0" lvl="0" marL="0" rtl="0" algn="l">
+              <a:lnSpc>
+                <a:spcPct val="100000"/>
+              </a:lnSpc>
+              <a:spcBef>
+                <a:spcPts val="0"/>
+              </a:spcBef>
+              <a:spcAft>
+                <a:spcPts val="0"/>
+              </a:spcAft>
+              <a:buNone/>
+            </a:pPr>
+            <a:r>
+              <a:rPr lang="en" sz="2100"/>
+              <a:t>Most quilt owners (who are not the quilt maker) know very little about exact dates that quilts were made or when quilt makers were born. We can see from the diversity of date formatting that owners gave the best information they had.</a:t>
+            </a:r>
+            <a:endParaRPr sz="2100"/>
+          </a:p>
+          <a:p>
+            <a:pPr indent="-317182" lvl="0" marL="457200" rtl="0" algn="l">
+              <a:spcBef>
+                <a:spcPts val="1200"/>
+              </a:spcBef>
+              <a:spcAft>
+                <a:spcPts val="0"/>
+              </a:spcAft>
+              <a:buSzPct val="100000"/>
               <a:buChar char="●"/>
             </a:pPr>
             <a:r>
@@ -11589,14 +11638,14 @@
             <a:endParaRPr/>
           </a:p>
           <a:p>
-            <a:pPr indent="-342900" lvl="0" marL="457200" rtl="0" algn="l">
-              <a:spcBef>
-                <a:spcPts val="0"/>
-              </a:spcBef>
-              <a:spcAft>
-                <a:spcPts val="0"/>
-              </a:spcAft>
-              <a:buSzPts val="1800"/>
+            <a:pPr indent="-317182" lvl="0" marL="457200" rtl="0" algn="l">
+              <a:spcBef>
+                <a:spcPts val="0"/>
+              </a:spcBef>
+              <a:spcAft>
+                <a:spcPts val="0"/>
+              </a:spcAft>
+              <a:buSzPct val="100000"/>
               <a:buChar char="●"/>
             </a:pPr>
             <a:r>
@@ -11606,14 +11655,14 @@
             <a:endParaRPr/>
           </a:p>
           <a:p>
-            <a:pPr indent="-342900" lvl="0" marL="457200" rtl="0" algn="l">
-              <a:spcBef>
-                <a:spcPts val="0"/>
-              </a:spcBef>
-              <a:spcAft>
-                <a:spcPts val="0"/>
-              </a:spcAft>
-              <a:buSzPts val="1800"/>
+            <a:pPr indent="-317182" lvl="0" marL="457200" rtl="0" algn="l">
+              <a:spcBef>
+                <a:spcPts val="0"/>
+              </a:spcBef>
+              <a:spcAft>
+                <a:spcPts val="0"/>
+              </a:spcAft>
+              <a:buSzPct val="100000"/>
               <a:buChar char="●"/>
             </a:pPr>
             <a:r>
@@ -11623,14 +11672,14 @@
             <a:endParaRPr/>
           </a:p>
           <a:p>
-            <a:pPr indent="-342900" lvl="0" marL="457200" rtl="0" algn="l">
-              <a:spcBef>
-                <a:spcPts val="0"/>
-              </a:spcBef>
-              <a:spcAft>
-                <a:spcPts val="0"/>
-              </a:spcAft>
-              <a:buSzPts val="1800"/>
+            <a:pPr indent="-317182" lvl="0" marL="457200" rtl="0" algn="l">
+              <a:spcBef>
+                <a:spcPts val="0"/>
+              </a:spcBef>
+              <a:spcAft>
+                <a:spcPts val="0"/>
+              </a:spcAft>
+              <a:buSzPct val="100000"/>
               <a:buChar char="●"/>
             </a:pPr>
             <a:r>
@@ -11640,14 +11689,14 @@
             <a:endParaRPr/>
           </a:p>
           <a:p>
-            <a:pPr indent="-342900" lvl="0" marL="457200" rtl="0" algn="l">
-              <a:spcBef>
-                <a:spcPts val="0"/>
-              </a:spcBef>
-              <a:spcAft>
-                <a:spcPts val="0"/>
-              </a:spcAft>
-              <a:buSzPts val="1800"/>
+            <a:pPr indent="-317182" lvl="0" marL="457200" rtl="0" algn="l">
+              <a:spcBef>
+                <a:spcPts val="0"/>
+              </a:spcBef>
+              <a:spcAft>
+                <a:spcPts val="0"/>
+              </a:spcAft>
+              <a:buSzPct val="100000"/>
               <a:buChar char="●"/>
             </a:pPr>
             <a:r>
@@ -11657,14 +11706,14 @@
             <a:endParaRPr/>
           </a:p>
           <a:p>
-            <a:pPr indent="-342900" lvl="0" marL="457200" rtl="0" algn="l">
-              <a:spcBef>
-                <a:spcPts val="0"/>
-              </a:spcBef>
-              <a:spcAft>
-                <a:spcPts val="0"/>
-              </a:spcAft>
-              <a:buSzPts val="1800"/>
+            <a:pPr indent="-317182" lvl="0" marL="457200" rtl="0" algn="l">
+              <a:spcBef>
+                <a:spcPts val="0"/>
+              </a:spcBef>
+              <a:spcAft>
+                <a:spcPts val="0"/>
+              </a:spcAft>
+              <a:buSzPct val="100000"/>
               <a:buChar char="●"/>
             </a:pPr>
             <a:r>
@@ -11674,14 +11723,14 @@
             <a:endParaRPr/>
           </a:p>
           <a:p>
-            <a:pPr indent="-342900" lvl="0" marL="457200" rtl="0" algn="l">
-              <a:spcBef>
-                <a:spcPts val="0"/>
-              </a:spcBef>
-              <a:spcAft>
-                <a:spcPts val="0"/>
-              </a:spcAft>
-              <a:buSzPts val="1800"/>
+            <a:pPr indent="-317182" lvl="0" marL="457200" rtl="0" algn="l">
+              <a:spcBef>
+                <a:spcPts val="0"/>
+              </a:spcBef>
+              <a:spcAft>
+                <a:spcPts val="0"/>
+              </a:spcAft>
+              <a:buSzPct val="100000"/>
               <a:buChar char="●"/>
             </a:pPr>
             <a:r>
@@ -11691,14 +11740,14 @@
             <a:endParaRPr/>
           </a:p>
           <a:p>
-            <a:pPr indent="-342900" lvl="0" marL="457200" rtl="0" algn="l">
-              <a:spcBef>
-                <a:spcPts val="0"/>
-              </a:spcBef>
-              <a:spcAft>
-                <a:spcPts val="0"/>
-              </a:spcAft>
-              <a:buSzPts val="1800"/>
+            <a:pPr indent="-317182" lvl="0" marL="457200" rtl="0" algn="l">
+              <a:spcBef>
+                <a:spcPts val="0"/>
+              </a:spcBef>
+              <a:spcAft>
+                <a:spcPts val="0"/>
+              </a:spcAft>
+              <a:buSzPct val="100000"/>
               <a:buChar char="●"/>
             </a:pPr>
             <a:r>
@@ -11708,14 +11757,14 @@
             <a:endParaRPr/>
           </a:p>
           <a:p>
-            <a:pPr indent="-342900" lvl="0" marL="457200" rtl="0" algn="l">
-              <a:spcBef>
-                <a:spcPts val="0"/>
-              </a:spcBef>
-              <a:spcAft>
-                <a:spcPts val="0"/>
-              </a:spcAft>
-              <a:buSzPts val="1800"/>
+            <a:pPr indent="-317182" lvl="0" marL="457200" rtl="0" algn="l">
+              <a:spcBef>
+                <a:spcPts val="0"/>
+              </a:spcBef>
+              <a:spcAft>
+                <a:spcPts val="0"/>
+              </a:spcAft>
+              <a:buSzPct val="100000"/>
               <a:buChar char="●"/>
             </a:pPr>
             <a:r>
@@ -11725,14 +11774,14 @@
             <a:endParaRPr/>
           </a:p>
           <a:p>
-            <a:pPr indent="-342900" lvl="0" marL="457200" rtl="0" algn="l">
-              <a:spcBef>
-                <a:spcPts val="0"/>
-              </a:spcBef>
-              <a:spcAft>
-                <a:spcPts val="0"/>
-              </a:spcAft>
-              <a:buSzPts val="1800"/>
+            <a:pPr indent="-317182" lvl="0" marL="457200" rtl="0" algn="l">
+              <a:spcBef>
+                <a:spcPts val="0"/>
+              </a:spcBef>
+              <a:spcAft>
+                <a:spcPts val="0"/>
+              </a:spcAft>
+              <a:buSzPct val="100000"/>
               <a:buChar char="●"/>
             </a:pPr>
             <a:r>
@@ -11742,14 +11791,14 @@
             <a:endParaRPr/>
           </a:p>
           <a:p>
-            <a:pPr indent="-342900" lvl="0" marL="457200" rtl="0" algn="l">
-              <a:spcBef>
-                <a:spcPts val="0"/>
-              </a:spcBef>
-              <a:spcAft>
-                <a:spcPts val="0"/>
-              </a:spcAft>
-              <a:buSzPts val="1800"/>
+            <a:pPr indent="-317182" lvl="0" marL="457200" rtl="0" algn="l">
+              <a:spcBef>
+                <a:spcPts val="0"/>
+              </a:spcBef>
+              <a:spcAft>
+                <a:spcPts val="0"/>
+              </a:spcAft>
+              <a:buSzPct val="100000"/>
               <a:buChar char="●"/>
             </a:pPr>
             <a:r>
@@ -11759,14 +11808,14 @@
             <a:endParaRPr/>
           </a:p>
           <a:p>
-            <a:pPr indent="-342900" lvl="0" marL="457200" rtl="0" algn="l">
-              <a:spcBef>
-                <a:spcPts val="0"/>
-              </a:spcBef>
-              <a:spcAft>
-                <a:spcPts val="0"/>
-              </a:spcAft>
-              <a:buSzPts val="1800"/>
+            <a:pPr indent="-317182" lvl="0" marL="457200" rtl="0" algn="l">
+              <a:spcBef>
+                <a:spcPts val="0"/>
+              </a:spcBef>
+              <a:spcAft>
+                <a:spcPts val="0"/>
+              </a:spcAft>
+              <a:buSzPct val="100000"/>
               <a:buChar char="●"/>
             </a:pPr>
             <a:r>
@@ -11869,18 +11918,18 @@
         </p:spPr>
         <p:txBody>
           <a:bodyPr anchorCtr="0" anchor="t" bIns="91425" lIns="91425" spcFirstLastPara="1" rIns="91425" wrap="square" tIns="91425">
-            <a:normAutofit lnSpcReduction="20000"/>
+            <a:normAutofit fontScale="92500" lnSpcReduction="10000"/>
           </a:bodyPr>
           <a:lstStyle/>
           <a:p>
-            <a:pPr indent="-342900" lvl="0" marL="457200" rtl="0" algn="l">
-              <a:spcBef>
-                <a:spcPts val="0"/>
-              </a:spcBef>
-              <a:spcAft>
-                <a:spcPts val="0"/>
-              </a:spcAft>
-              <a:buSzPts val="1800"/>
+            <a:pPr indent="-334327" lvl="0" marL="457200" rtl="0" algn="l">
+              <a:spcBef>
+                <a:spcPts val="0"/>
+              </a:spcBef>
+              <a:spcAft>
+                <a:spcPts val="0"/>
+              </a:spcAft>
+              <a:buSzPct val="100000"/>
               <a:buChar char="●"/>
             </a:pPr>
             <a:r>
@@ -11890,99 +11939,65 @@
             <a:endParaRPr/>
           </a:p>
           <a:p>
-            <a:pPr indent="-342900" lvl="0" marL="457200" rtl="0" algn="l">
-              <a:spcBef>
-                <a:spcPts val="0"/>
-              </a:spcBef>
-              <a:spcAft>
-                <a:spcPts val="0"/>
-              </a:spcAft>
-              <a:buSzPts val="1800"/>
+            <a:pPr indent="-334327" lvl="0" marL="457200" rtl="0" algn="l">
+              <a:spcBef>
+                <a:spcPts val="0"/>
+              </a:spcBef>
+              <a:spcAft>
+                <a:spcPts val="0"/>
+              </a:spcAft>
+              <a:buSzPct val="100000"/>
               <a:buChar char="●"/>
             </a:pPr>
             <a:r>
               <a:rPr lang="en"/>
-              <a:t>The maker is only documented if there is a quilt “good enough” to get into the index.  “Good enough” is determined by the reporter and might be based on:</a:t>
-            </a:r>
-            <a:endParaRPr/>
-          </a:p>
-          <a:p>
-            <a:pPr indent="-317500" lvl="1" marL="914400" rtl="0" algn="l">
-              <a:spcBef>
-                <a:spcPts val="0"/>
-              </a:spcBef>
-              <a:spcAft>
-                <a:spcPts val="0"/>
-              </a:spcAft>
-              <a:buSzPts val="1400"/>
-              <a:buChar char="○"/>
+              <a:t>The maker is only documented if there is a quilt in the QuiltIndex. The quilt owner (who is often not the quilt maker) chooses which quilts to enter into QuiltIndex.</a:t>
+            </a:r>
+            <a:endParaRPr/>
+          </a:p>
+          <a:p>
+            <a:pPr indent="-334327" lvl="0" marL="457200" rtl="0" algn="l">
+              <a:spcBef>
+                <a:spcPts val="0"/>
+              </a:spcBef>
+              <a:spcAft>
+                <a:spcPts val="0"/>
+              </a:spcAft>
+              <a:buSzPct val="100000"/>
+              <a:buChar char="●"/>
             </a:pPr>
             <a:r>
               <a:rPr lang="en"/>
-              <a:t>Aesthetically pleasing</a:t>
-            </a:r>
-            <a:endParaRPr/>
-          </a:p>
-          <a:p>
-            <a:pPr indent="-317500" lvl="1" marL="914400" rtl="0" algn="l">
-              <a:spcBef>
-                <a:spcPts val="0"/>
-              </a:spcBef>
-              <a:spcAft>
-                <a:spcPts val="0"/>
-              </a:spcAft>
-              <a:buSzPts val="1400"/>
-              <a:buChar char="○"/>
+              <a:t>Many records of makers were incomplete, because most antique quilts are unsigned and the makers unknown. Even when the maker is known, information about the maker can be difficult to collect.</a:t>
+            </a:r>
+            <a:endParaRPr/>
+          </a:p>
+          <a:p>
+            <a:pPr indent="-334327" lvl="0" marL="457200" rtl="0" algn="l">
+              <a:spcBef>
+                <a:spcPts val="0"/>
+              </a:spcBef>
+              <a:spcAft>
+                <a:spcPts val="0"/>
+              </a:spcAft>
+              <a:buSzPct val="100000"/>
+              <a:buChar char="●"/>
             </a:pPr>
             <a:r>
               <a:rPr lang="en"/>
-              <a:t>Historically important</a:t>
-            </a:r>
-            <a:endParaRPr/>
-          </a:p>
-          <a:p>
-            <a:pPr indent="-317500" lvl="1" marL="914400" rtl="0" algn="l">
-              <a:spcBef>
-                <a:spcPts val="0"/>
-              </a:spcBef>
-              <a:spcAft>
-                <a:spcPts val="0"/>
-              </a:spcAft>
-              <a:buSzPts val="1400"/>
-              <a:buChar char="○"/>
-            </a:pPr>
-            <a:r>
-              <a:rPr lang="en"/>
-              <a:t>Sentimental value</a:t>
-            </a:r>
-            <a:endParaRPr/>
-          </a:p>
-          <a:p>
-            <a:pPr indent="-342900" lvl="0" marL="457200" rtl="0" algn="l">
-              <a:spcBef>
-                <a:spcPts val="0"/>
-              </a:spcBef>
-              <a:spcAft>
-                <a:spcPts val="0"/>
-              </a:spcAft>
-              <a:buSzPts val="1800"/>
-              <a:buChar char="●"/>
-            </a:pPr>
-            <a:r>
-              <a:rPr lang="en"/>
-              <a:t>Many records of makers were incomplete, so couldn’t be used in the analysis. For this analysis, a complete maker record needed:</a:t>
-            </a:r>
-            <a:endParaRPr/>
-          </a:p>
-          <a:p>
-            <a:pPr indent="-317500" lvl="1" marL="914400" rtl="0" algn="l">
-              <a:spcBef>
-                <a:spcPts val="0"/>
-              </a:spcBef>
-              <a:spcAft>
-                <a:spcPts val="0"/>
-              </a:spcAft>
-              <a:buSzPts val="1400"/>
+              <a:t>For this analysis, maker records were analyzed if they had all of:</a:t>
+            </a:r>
+            <a:endParaRPr/>
+          </a:p>
+          <a:p>
+            <a:pPr indent="-310832" lvl="1" marL="914400" rtl="0" algn="l">
+              <a:spcBef>
+                <a:spcPts val="0"/>
+              </a:spcBef>
+              <a:spcAft>
+                <a:spcPts val="0"/>
+              </a:spcAft>
+              <a:buSzPct val="100000"/>
               <a:buChar char="○"/>
             </a:pPr>
             <a:r>
@@ -11992,14 +12007,14 @@
             <a:endParaRPr/>
           </a:p>
           <a:p>
-            <a:pPr indent="-317500" lvl="1" marL="914400" rtl="0" algn="l">
-              <a:spcBef>
-                <a:spcPts val="0"/>
-              </a:spcBef>
-              <a:spcAft>
-                <a:spcPts val="0"/>
-              </a:spcAft>
-              <a:buSzPts val="1400"/>
+            <a:pPr indent="-310832" lvl="1" marL="914400" rtl="0" algn="l">
+              <a:spcBef>
+                <a:spcPts val="0"/>
+              </a:spcBef>
+              <a:spcAft>
+                <a:spcPts val="0"/>
+              </a:spcAft>
+              <a:buSzPct val="100000"/>
               <a:buChar char="○"/>
             </a:pPr>
             <a:r>
@@ -12009,14 +12024,14 @@
             <a:endParaRPr/>
           </a:p>
           <a:p>
-            <a:pPr indent="-317500" lvl="1" marL="914400" rtl="0" algn="l">
-              <a:spcBef>
-                <a:spcPts val="0"/>
-              </a:spcBef>
-              <a:spcAft>
-                <a:spcPts val="0"/>
-              </a:spcAft>
-              <a:buSzPts val="1400"/>
+            <a:pPr indent="-310832" lvl="1" marL="914400" rtl="0" algn="l">
+              <a:spcBef>
+                <a:spcPts val="0"/>
+              </a:spcBef>
+              <a:spcAft>
+                <a:spcPts val="0"/>
+              </a:spcAft>
+              <a:buSzPct val="100000"/>
               <a:buChar char="○"/>
             </a:pPr>
             <a:r>
@@ -12026,14 +12041,14 @@
             <a:endParaRPr/>
           </a:p>
           <a:p>
-            <a:pPr indent="-317500" lvl="1" marL="914400" rtl="0" algn="l">
-              <a:spcBef>
-                <a:spcPts val="0"/>
-              </a:spcBef>
-              <a:spcAft>
-                <a:spcPts val="0"/>
-              </a:spcAft>
-              <a:buSzPts val="1400"/>
+            <a:pPr indent="-310832" lvl="1" marL="914400" rtl="0" algn="l">
+              <a:spcBef>
+                <a:spcPts val="0"/>
+              </a:spcBef>
+              <a:spcAft>
+                <a:spcPts val="0"/>
+              </a:spcAft>
+              <a:buSzPct val="100000"/>
               <a:buChar char="○"/>
             </a:pPr>
             <a:r>
@@ -12043,14 +12058,14 @@
             <a:endParaRPr/>
           </a:p>
           <a:p>
-            <a:pPr indent="-317500" lvl="1" marL="914400" rtl="0" algn="l">
-              <a:spcBef>
-                <a:spcPts val="0"/>
-              </a:spcBef>
-              <a:spcAft>
-                <a:spcPts val="0"/>
-              </a:spcAft>
-              <a:buSzPts val="1400"/>
+            <a:pPr indent="-310832" lvl="1" marL="914400" rtl="0" algn="l">
+              <a:spcBef>
+                <a:spcPts val="0"/>
+              </a:spcBef>
+              <a:spcAft>
+                <a:spcPts val="0"/>
+              </a:spcAft>
+              <a:buSzPct val="100000"/>
               <a:buChar char="○"/>
             </a:pPr>
             <a:r>
@@ -12060,14 +12075,14 @@
             <a:endParaRPr/>
           </a:p>
           <a:p>
-            <a:pPr indent="-317500" lvl="1" marL="914400" rtl="0" algn="l">
-              <a:spcBef>
-                <a:spcPts val="0"/>
-              </a:spcBef>
-              <a:spcAft>
-                <a:spcPts val="0"/>
-              </a:spcAft>
-              <a:buSzPts val="1400"/>
+            <a:pPr indent="-310832" lvl="1" marL="914400" rtl="0" algn="l">
+              <a:spcBef>
+                <a:spcPts val="0"/>
+              </a:spcBef>
+              <a:spcAft>
+                <a:spcPts val="0"/>
+              </a:spcAft>
+              <a:buSzPct val="100000"/>
               <a:buChar char="○"/>
             </a:pPr>
             <a:r>
@@ -12790,6 +12805,285 @@
 </file>
 
 <file path=ppt/theme/theme1.xml><?xml version="1.0" encoding="utf-8"?>
+<a:theme xmlns:a="http://schemas.openxmlformats.org/drawingml/2006/main" xmlns:r="http://schemas.openxmlformats.org/officeDocument/2006/relationships" name="Simple Light">
+  <a:themeElements>
+    <a:clrScheme name="Simple Light">
+      <a:dk1>
+        <a:srgbClr val="000000"/>
+      </a:dk1>
+      <a:lt1>
+        <a:srgbClr val="FFFFFF"/>
+      </a:lt1>
+      <a:dk2>
+        <a:srgbClr val="595959"/>
+      </a:dk2>
+      <a:lt2>
+        <a:srgbClr val="EEEEEE"/>
+      </a:lt2>
+      <a:accent1>
+        <a:srgbClr val="4285F4"/>
+      </a:accent1>
+      <a:accent2>
+        <a:srgbClr val="212121"/>
+      </a:accent2>
+      <a:accent3>
+        <a:srgbClr val="78909C"/>
+      </a:accent3>
+      <a:accent4>
+        <a:srgbClr val="FFAB40"/>
+      </a:accent4>
+      <a:accent5>
+        <a:srgbClr val="0097A7"/>
+      </a:accent5>
+      <a:accent6>
+        <a:srgbClr val="EEFF41"/>
+      </a:accent6>
+      <a:hlink>
+        <a:srgbClr val="0097A7"/>
+      </a:hlink>
+      <a:folHlink>
+        <a:srgbClr val="0097A7"/>
+      </a:folHlink>
+    </a:clrScheme>
+    <a:fontScheme name="Office">
+      <a:majorFont>
+        <a:latin typeface="Arial"/>
+        <a:ea typeface=""/>
+        <a:cs typeface=""/>
+        <a:font script="Jpan" typeface="ＭＳ Ｐゴシック"/>
+        <a:font script="Hang" typeface="맑은 고딕"/>
+        <a:font script="Hans" typeface="宋体"/>
+        <a:font script="Hant" typeface="新細明體"/>
+        <a:font script="Arab" typeface="Times New Roman"/>
+        <a:font script="Hebr" typeface="Times New Roman"/>
+        <a:font script="Thai" typeface="Angsana New"/>
+        <a:font script="Ethi" typeface="Nyala"/>
+        <a:font script="Beng" typeface="Vrinda"/>
+        <a:font script="Gujr" typeface="Shruti"/>
+        <a:font script="Khmr" typeface="MoolBoran"/>
+        <a:font script="Knda" typeface="Tunga"/>
+        <a:font script="Guru" typeface="Raavi"/>
+        <a:font script="Cans" typeface="Euphemia"/>
+        <a:font script="Cher" typeface="Plantagenet Cherokee"/>
+        <a:font script="Yiii" typeface="Microsoft Yi Baiti"/>
+        <a:font script="Tibt" typeface="Microsoft Himalaya"/>
+        <a:font script="Thaa" typeface="MV Boli"/>
+        <a:font script="Deva" typeface="Mangal"/>
+        <a:font script="Telu" typeface="Gautami"/>
+        <a:font script="Taml" typeface="Latha"/>
+        <a:font script="Syrc" typeface="Estrangelo Edessa"/>
+        <a:font script="Orya" typeface="Kalinga"/>
+        <a:font script="Mlym" typeface="Kartika"/>
+        <a:font script="Laoo" typeface="DokChampa"/>
+        <a:font script="Sinh" typeface="Iskoola Pota"/>
+        <a:font script="Mong" typeface="Mongolian Baiti"/>
+        <a:font script="Viet" typeface="Times New Roman"/>
+        <a:font script="Uigh" typeface="Microsoft Uighur"/>
+        <a:font script="Geor" typeface="Sylfaen"/>
+      </a:majorFont>
+      <a:minorFont>
+        <a:latin typeface="Arial"/>
+        <a:ea typeface=""/>
+        <a:cs typeface=""/>
+        <a:font script="Jpan" typeface="ＭＳ Ｐゴシック"/>
+        <a:font script="Hang" typeface="맑은 고딕"/>
+        <a:font script="Hans" typeface="宋体"/>
+        <a:font script="Hant" typeface="新細明體"/>
+        <a:font script="Arab" typeface="Arial"/>
+        <a:font script="Hebr" typeface="Arial"/>
+        <a:font script="Thai" typeface="Cordia New"/>
+        <a:font script="Ethi" typeface="Nyala"/>
+        <a:font script="Beng" typeface="Vrinda"/>
+        <a:font script="Gujr" typeface="Shruti"/>
+        <a:font script="Khmr" typeface="DaunPenh"/>
+        <a:font script="Knda" typeface="Tunga"/>
+        <a:font script="Guru" typeface="Raavi"/>
+        <a:font script="Cans" typeface="Euphemia"/>
+        <a:font script="Cher" typeface="Plantagenet Cherokee"/>
+        <a:font script="Yiii" typeface="Microsoft Yi Baiti"/>
+        <a:font script="Tibt" typeface="Microsoft Himalaya"/>
+        <a:font script="Thaa" typeface="MV Boli"/>
+        <a:font script="Deva" typeface="Mangal"/>
+        <a:font script="Telu" typeface="Gautami"/>
+        <a:font script="Taml" typeface="Latha"/>
+        <a:font script="Syrc" typeface="Estrangelo Edessa"/>
+        <a:font script="Orya" typeface="Kalinga"/>
+        <a:font script="Mlym" typeface="Kartika"/>
+        <a:font script="Laoo" typeface="DokChampa"/>
+        <a:font script="Sinh" typeface="Iskoola Pota"/>
+        <a:font script="Mong" typeface="Mongolian Baiti"/>
+        <a:font script="Viet" typeface="Arial"/>
+        <a:font script="Uigh" typeface="Microsoft Uighur"/>
+        <a:font script="Geor" typeface="Sylfaen"/>
+      </a:minorFont>
+    </a:fontScheme>
+    <a:fmtScheme name="Office">
+      <a:fillStyleLst>
+        <a:solidFill>
+          <a:schemeClr val="phClr"/>
+        </a:solidFill>
+        <a:gradFill rotWithShape="1">
+          <a:gsLst>
+            <a:gs pos="0">
+              <a:schemeClr val="phClr">
+                <a:tint val="50000"/>
+                <a:satMod val="300000"/>
+              </a:schemeClr>
+            </a:gs>
+            <a:gs pos="35000">
+              <a:schemeClr val="phClr">
+                <a:tint val="37000"/>
+                <a:satMod val="300000"/>
+              </a:schemeClr>
+            </a:gs>
+            <a:gs pos="100000">
+              <a:schemeClr val="phClr">
+                <a:tint val="15000"/>
+                <a:satMod val="350000"/>
+              </a:schemeClr>
+            </a:gs>
+          </a:gsLst>
+          <a:lin ang="16200000" scaled="1"/>
+        </a:gradFill>
+        <a:gradFill rotWithShape="1">
+          <a:gsLst>
+            <a:gs pos="0">
+              <a:schemeClr val="phClr">
+                <a:tint val="100000"/>
+                <a:shade val="100000"/>
+                <a:satMod val="130000"/>
+              </a:schemeClr>
+            </a:gs>
+            <a:gs pos="100000">
+              <a:schemeClr val="phClr">
+                <a:tint val="50000"/>
+                <a:shade val="100000"/>
+                <a:satMod val="350000"/>
+              </a:schemeClr>
+            </a:gs>
+          </a:gsLst>
+          <a:lin ang="16200000" scaled="0"/>
+        </a:gradFill>
+      </a:fillStyleLst>
+      <a:lnStyleLst>
+        <a:ln w="9525" cap="flat" cmpd="sng" algn="ctr">
+          <a:solidFill>
+            <a:schemeClr val="phClr">
+              <a:shade val="95000"/>
+              <a:satMod val="105000"/>
+            </a:schemeClr>
+          </a:solidFill>
+          <a:prstDash val="solid"/>
+        </a:ln>
+        <a:ln w="25400" cap="flat" cmpd="sng" algn="ctr">
+          <a:solidFill>
+            <a:schemeClr val="phClr"/>
+          </a:solidFill>
+          <a:prstDash val="solid"/>
+        </a:ln>
+        <a:ln w="38100" cap="flat" cmpd="sng" algn="ctr">
+          <a:solidFill>
+            <a:schemeClr val="phClr"/>
+          </a:solidFill>
+          <a:prstDash val="solid"/>
+        </a:ln>
+      </a:lnStyleLst>
+      <a:effectStyleLst>
+        <a:effectStyle>
+          <a:effectLst>
+            <a:outerShdw blurRad="40000" dist="20000" dir="5400000" rotWithShape="0">
+              <a:srgbClr val="000000">
+                <a:alpha val="38000"/>
+              </a:srgbClr>
+            </a:outerShdw>
+          </a:effectLst>
+        </a:effectStyle>
+        <a:effectStyle>
+          <a:effectLst>
+            <a:outerShdw blurRad="40000" dist="23000" dir="5400000" rotWithShape="0">
+              <a:srgbClr val="000000">
+                <a:alpha val="35000"/>
+              </a:srgbClr>
+            </a:outerShdw>
+          </a:effectLst>
+        </a:effectStyle>
+        <a:effectStyle>
+          <a:effectLst>
+            <a:outerShdw blurRad="40000" dist="23000" dir="5400000" rotWithShape="0">
+              <a:srgbClr val="000000">
+                <a:alpha val="35000"/>
+              </a:srgbClr>
+            </a:outerShdw>
+          </a:effectLst>
+          <a:scene3d>
+            <a:camera prst="orthographicFront">
+              <a:rot lat="0" lon="0" rev="0"/>
+            </a:camera>
+            <a:lightRig rig="threePt" dir="t">
+              <a:rot lat="0" lon="0" rev="1200000"/>
+            </a:lightRig>
+          </a:scene3d>
+          <a:sp3d>
+            <a:bevelT w="63500" h="25400"/>
+          </a:sp3d>
+        </a:effectStyle>
+      </a:effectStyleLst>
+      <a:bgFillStyleLst>
+        <a:solidFill>
+          <a:schemeClr val="phClr"/>
+        </a:solidFill>
+        <a:gradFill rotWithShape="1">
+          <a:gsLst>
+            <a:gs pos="0">
+              <a:schemeClr val="phClr">
+                <a:tint val="40000"/>
+                <a:satMod val="350000"/>
+              </a:schemeClr>
+            </a:gs>
+            <a:gs pos="40000">
+              <a:schemeClr val="phClr">
+                <a:tint val="45000"/>
+                <a:shade val="99000"/>
+                <a:satMod val="350000"/>
+              </a:schemeClr>
+            </a:gs>
+            <a:gs pos="100000">
+              <a:schemeClr val="phClr">
+                <a:shade val="20000"/>
+                <a:satMod val="255000"/>
+              </a:schemeClr>
+            </a:gs>
+          </a:gsLst>
+          <a:path path="circle">
+            <a:fillToRect l="50000" t="-80000" r="50000" b="180000"/>
+          </a:path>
+        </a:gradFill>
+        <a:gradFill rotWithShape="1">
+          <a:gsLst>
+            <a:gs pos="0">
+              <a:schemeClr val="phClr">
+                <a:tint val="80000"/>
+                <a:satMod val="300000"/>
+              </a:schemeClr>
+            </a:gs>
+            <a:gs pos="100000">
+              <a:schemeClr val="phClr">
+                <a:shade val="30000"/>
+                <a:satMod val="200000"/>
+              </a:schemeClr>
+            </a:gs>
+          </a:gsLst>
+          <a:path path="circle">
+            <a:fillToRect l="50000" t="50000" r="50000" b="50000"/>
+          </a:path>
+        </a:gradFill>
+      </a:bgFillStyleLst>
+    </a:fmtScheme>
+  </a:themeElements>
+</a:theme>
+</file>
+
+<file path=ppt/theme/theme2.xml><?xml version="1.0" encoding="utf-8"?>
 <a:theme xmlns:a="http://schemas.openxmlformats.org/drawingml/2006/main" xmlns:r="http://schemas.openxmlformats.org/officeDocument/2006/relationships">
   <a:themeElements>
     <a:clrScheme name="Default">
@@ -13066,283 +13360,4 @@
     </a:fmtScheme>
   </a:themeElements>
 </a:theme>
-</file>
-
-<file path=ppt/theme/theme2.xml><?xml version="1.0" encoding="utf-8"?>
-<a:theme xmlns:a="http://schemas.openxmlformats.org/drawingml/2006/main" xmlns:r="http://schemas.openxmlformats.org/officeDocument/2006/relationships" name="Simple Light">
-  <a:themeElements>
-    <a:clrScheme name="Simple Light">
-      <a:dk1>
-        <a:srgbClr val="000000"/>
-      </a:dk1>
-      <a:lt1>
-        <a:srgbClr val="FFFFFF"/>
-      </a:lt1>
-      <a:dk2>
-        <a:srgbClr val="595959"/>
-      </a:dk2>
-      <a:lt2>
-        <a:srgbClr val="EEEEEE"/>
-      </a:lt2>
-      <a:accent1>
-        <a:srgbClr val="4285F4"/>
-      </a:accent1>
-      <a:accent2>
-        <a:srgbClr val="212121"/>
-      </a:accent2>
-      <a:accent3>
-        <a:srgbClr val="78909C"/>
-      </a:accent3>
-      <a:accent4>
-        <a:srgbClr val="FFAB40"/>
-      </a:accent4>
-      <a:accent5>
-        <a:srgbClr val="0097A7"/>
-      </a:accent5>
-      <a:accent6>
-        <a:srgbClr val="EEFF41"/>
-      </a:accent6>
-      <a:hlink>
-        <a:srgbClr val="0097A7"/>
-      </a:hlink>
-      <a:folHlink>
-        <a:srgbClr val="0097A7"/>
-      </a:folHlink>
-    </a:clrScheme>
-    <a:fontScheme name="Office">
-      <a:majorFont>
-        <a:latin typeface="Arial"/>
-        <a:ea typeface=""/>
-        <a:cs typeface=""/>
-        <a:font script="Jpan" typeface="ＭＳ Ｐゴシック"/>
-        <a:font script="Hang" typeface="맑은 고딕"/>
-        <a:font script="Hans" typeface="宋体"/>
-        <a:font script="Hant" typeface="新細明體"/>
-        <a:font script="Arab" typeface="Times New Roman"/>
-        <a:font script="Hebr" typeface="Times New Roman"/>
-        <a:font script="Thai" typeface="Angsana New"/>
-        <a:font script="Ethi" typeface="Nyala"/>
-        <a:font script="Beng" typeface="Vrinda"/>
-        <a:font script="Gujr" typeface="Shruti"/>
-        <a:font script="Khmr" typeface="MoolBoran"/>
-        <a:font script="Knda" typeface="Tunga"/>
-        <a:font script="Guru" typeface="Raavi"/>
-        <a:font script="Cans" typeface="Euphemia"/>
-        <a:font script="Cher" typeface="Plantagenet Cherokee"/>
-        <a:font script="Yiii" typeface="Microsoft Yi Baiti"/>
-        <a:font script="Tibt" typeface="Microsoft Himalaya"/>
-        <a:font script="Thaa" typeface="MV Boli"/>
-        <a:font script="Deva" typeface="Mangal"/>
-        <a:font script="Telu" typeface="Gautami"/>
-        <a:font script="Taml" typeface="Latha"/>
-        <a:font script="Syrc" typeface="Estrangelo Edessa"/>
-        <a:font script="Orya" typeface="Kalinga"/>
-        <a:font script="Mlym" typeface="Kartika"/>
-        <a:font script="Laoo" typeface="DokChampa"/>
-        <a:font script="Sinh" typeface="Iskoola Pota"/>
-        <a:font script="Mong" typeface="Mongolian Baiti"/>
-        <a:font script="Viet" typeface="Times New Roman"/>
-        <a:font script="Uigh" typeface="Microsoft Uighur"/>
-        <a:font script="Geor" typeface="Sylfaen"/>
-      </a:majorFont>
-      <a:minorFont>
-        <a:latin typeface="Arial"/>
-        <a:ea typeface=""/>
-        <a:cs typeface=""/>
-        <a:font script="Jpan" typeface="ＭＳ Ｐゴシック"/>
-        <a:font script="Hang" typeface="맑은 고딕"/>
-        <a:font script="Hans" typeface="宋体"/>
-        <a:font script="Hant" typeface="新細明體"/>
-        <a:font script="Arab" typeface="Arial"/>
-        <a:font script="Hebr" typeface="Arial"/>
-        <a:font script="Thai" typeface="Cordia New"/>
-        <a:font script="Ethi" typeface="Nyala"/>
-        <a:font script="Beng" typeface="Vrinda"/>
-        <a:font script="Gujr" typeface="Shruti"/>
-        <a:font script="Khmr" typeface="DaunPenh"/>
-        <a:font script="Knda" typeface="Tunga"/>
-        <a:font script="Guru" typeface="Raavi"/>
-        <a:font script="Cans" typeface="Euphemia"/>
-        <a:font script="Cher" typeface="Plantagenet Cherokee"/>
-        <a:font script="Yiii" typeface="Microsoft Yi Baiti"/>
-        <a:font script="Tibt" typeface="Microsoft Himalaya"/>
-        <a:font script="Thaa" typeface="MV Boli"/>
-        <a:font script="Deva" typeface="Mangal"/>
-        <a:font script="Telu" typeface="Gautami"/>
-        <a:font script="Taml" typeface="Latha"/>
-        <a:font script="Syrc" typeface="Estrangelo Edessa"/>
-        <a:font script="Orya" typeface="Kalinga"/>
-        <a:font script="Mlym" typeface="Kartika"/>
-        <a:font script="Laoo" typeface="DokChampa"/>
-        <a:font script="Sinh" typeface="Iskoola Pota"/>
-        <a:font script="Mong" typeface="Mongolian Baiti"/>
-        <a:font script="Viet" typeface="Arial"/>
-        <a:font script="Uigh" typeface="Microsoft Uighur"/>
-        <a:font script="Geor" typeface="Sylfaen"/>
-      </a:minorFont>
-    </a:fontScheme>
-    <a:fmtScheme name="Office">
-      <a:fillStyleLst>
-        <a:solidFill>
-          <a:schemeClr val="phClr"/>
-        </a:solidFill>
-        <a:gradFill rotWithShape="1">
-          <a:gsLst>
-            <a:gs pos="0">
-              <a:schemeClr val="phClr">
-                <a:tint val="50000"/>
-                <a:satMod val="300000"/>
-              </a:schemeClr>
-            </a:gs>
-            <a:gs pos="35000">
-              <a:schemeClr val="phClr">
-                <a:tint val="37000"/>
-                <a:satMod val="300000"/>
-              </a:schemeClr>
-            </a:gs>
-            <a:gs pos="100000">
-              <a:schemeClr val="phClr">
-                <a:tint val="15000"/>
-                <a:satMod val="350000"/>
-              </a:schemeClr>
-            </a:gs>
-          </a:gsLst>
-          <a:lin ang="16200000" scaled="1"/>
-        </a:gradFill>
-        <a:gradFill rotWithShape="1">
-          <a:gsLst>
-            <a:gs pos="0">
-              <a:schemeClr val="phClr">
-                <a:tint val="100000"/>
-                <a:shade val="100000"/>
-                <a:satMod val="130000"/>
-              </a:schemeClr>
-            </a:gs>
-            <a:gs pos="100000">
-              <a:schemeClr val="phClr">
-                <a:tint val="50000"/>
-                <a:shade val="100000"/>
-                <a:satMod val="350000"/>
-              </a:schemeClr>
-            </a:gs>
-          </a:gsLst>
-          <a:lin ang="16200000" scaled="0"/>
-        </a:gradFill>
-      </a:fillStyleLst>
-      <a:lnStyleLst>
-        <a:ln w="9525" cap="flat" cmpd="sng" algn="ctr">
-          <a:solidFill>
-            <a:schemeClr val="phClr">
-              <a:shade val="95000"/>
-              <a:satMod val="105000"/>
-            </a:schemeClr>
-          </a:solidFill>
-          <a:prstDash val="solid"/>
-        </a:ln>
-        <a:ln w="25400" cap="flat" cmpd="sng" algn="ctr">
-          <a:solidFill>
-            <a:schemeClr val="phClr"/>
-          </a:solidFill>
-          <a:prstDash val="solid"/>
-        </a:ln>
-        <a:ln w="38100" cap="flat" cmpd="sng" algn="ctr">
-          <a:solidFill>
-            <a:schemeClr val="phClr"/>
-          </a:solidFill>
-          <a:prstDash val="solid"/>
-        </a:ln>
-      </a:lnStyleLst>
-      <a:effectStyleLst>
-        <a:effectStyle>
-          <a:effectLst>
-            <a:outerShdw blurRad="40000" dist="20000" dir="5400000" rotWithShape="0">
-              <a:srgbClr val="000000">
-                <a:alpha val="38000"/>
-              </a:srgbClr>
-            </a:outerShdw>
-          </a:effectLst>
-        </a:effectStyle>
-        <a:effectStyle>
-          <a:effectLst>
-            <a:outerShdw blurRad="40000" dist="23000" dir="5400000" rotWithShape="0">
-              <a:srgbClr val="000000">
-                <a:alpha val="35000"/>
-              </a:srgbClr>
-            </a:outerShdw>
-          </a:effectLst>
-        </a:effectStyle>
-        <a:effectStyle>
-          <a:effectLst>
-            <a:outerShdw blurRad="40000" dist="23000" dir="5400000" rotWithShape="0">
-              <a:srgbClr val="000000">
-                <a:alpha val="35000"/>
-              </a:srgbClr>
-            </a:outerShdw>
-          </a:effectLst>
-          <a:scene3d>
-            <a:camera prst="orthographicFront">
-              <a:rot lat="0" lon="0" rev="0"/>
-            </a:camera>
-            <a:lightRig rig="threePt" dir="t">
-              <a:rot lat="0" lon="0" rev="1200000"/>
-            </a:lightRig>
-          </a:scene3d>
-          <a:sp3d>
-            <a:bevelT w="63500" h="25400"/>
-          </a:sp3d>
-        </a:effectStyle>
-      </a:effectStyleLst>
-      <a:bgFillStyleLst>
-        <a:solidFill>
-          <a:schemeClr val="phClr"/>
-        </a:solidFill>
-        <a:gradFill rotWithShape="1">
-          <a:gsLst>
-            <a:gs pos="0">
-              <a:schemeClr val="phClr">
-                <a:tint val="40000"/>
-                <a:satMod val="350000"/>
-              </a:schemeClr>
-            </a:gs>
-            <a:gs pos="40000">
-              <a:schemeClr val="phClr">
-                <a:tint val="45000"/>
-                <a:shade val="99000"/>
-                <a:satMod val="350000"/>
-              </a:schemeClr>
-            </a:gs>
-            <a:gs pos="100000">
-              <a:schemeClr val="phClr">
-                <a:shade val="20000"/>
-                <a:satMod val="255000"/>
-              </a:schemeClr>
-            </a:gs>
-          </a:gsLst>
-          <a:path path="circle">
-            <a:fillToRect l="50000" t="-80000" r="50000" b="180000"/>
-          </a:path>
-        </a:gradFill>
-        <a:gradFill rotWithShape="1">
-          <a:gsLst>
-            <a:gs pos="0">
-              <a:schemeClr val="phClr">
-                <a:tint val="80000"/>
-                <a:satMod val="300000"/>
-              </a:schemeClr>
-            </a:gs>
-            <a:gs pos="100000">
-              <a:schemeClr val="phClr">
-                <a:shade val="30000"/>
-                <a:satMod val="200000"/>
-              </a:schemeClr>
-            </a:gs>
-          </a:gsLst>
-          <a:path path="circle">
-            <a:fillToRect l="50000" t="50000" r="50000" b="50000"/>
-          </a:path>
-        </a:gradFill>
-      </a:bgFillStyleLst>
-    </a:fmtScheme>
-  </a:themeElements>
-</a:theme>
 </file>
</xml_diff>